<commit_message>
Update TESI - INTELLIGENZA ARTIFICIALE PER IL RILEVAMENTO DEI PEDONI IN AMBIENTE SIMULATO.pptx
</commit_message>
<xml_diff>
--- a/media/documents/CrossWalk/TESI - INTELLIGENZA ARTIFICIALE PER IL RILEVAMENTO DEI PEDONI IN AMBIENTE SIMULATO.pptx
+++ b/media/documents/CrossWalk/TESI - INTELLIGENZA ARTIFICIALE PER IL RILEVAMENTO DEI PEDONI IN AMBIENTE SIMULATO.pptx
@@ -5,7 +5,7 @@
     <p:sldMasterId id="2147483678" r:id="rId1"/>
   </p:sldMasterIdLst>
   <p:notesMasterIdLst>
-    <p:notesMasterId r:id="rId19"/>
+    <p:notesMasterId r:id="rId18"/>
   </p:notesMasterIdLst>
   <p:sldIdLst>
     <p:sldId id="256" r:id="rId2"/>
@@ -23,8 +23,7 @@
     <p:sldId id="303" r:id="rId14"/>
     <p:sldId id="270" r:id="rId15"/>
     <p:sldId id="272" r:id="rId16"/>
-    <p:sldId id="279" r:id="rId17"/>
-    <p:sldId id="304" r:id="rId18"/>
+    <p:sldId id="304" r:id="rId17"/>
   </p:sldIdLst>
   <p:sldSz cx="9144000" cy="5143500" type="screen16x9"/>
   <p:notesSz cx="6858000" cy="9144000"/>
@@ -1454,110 +1453,6 @@
   <p:cSld>
     <p:spTree>
       <p:nvGrpSpPr>
-        <p:cNvPr id="1" name="Shape 600"/>
-        <p:cNvGrpSpPr/>
-        <p:nvPr/>
-      </p:nvGrpSpPr>
-      <p:grpSpPr>
-        <a:xfrm>
-          <a:off x="0" y="0"/>
-          <a:ext cx="0" cy="0"/>
-          <a:chOff x="0" y="0"/>
-          <a:chExt cx="0" cy="0"/>
-        </a:xfrm>
-      </p:grpSpPr>
-      <p:sp>
-        <p:nvSpPr>
-          <p:cNvPr id="601" name="Google Shape;601;g8f7179da94_0_64:notes"/>
-          <p:cNvSpPr>
-            <a:spLocks noGrp="1" noRot="1" noChangeAspect="1"/>
-          </p:cNvSpPr>
-          <p:nvPr>
-            <p:ph type="sldImg" idx="2"/>
-          </p:nvPr>
-        </p:nvSpPr>
-        <p:spPr>
-          <a:xfrm>
-            <a:off x="381000" y="685800"/>
-            <a:ext cx="6096000" cy="3429000"/>
-          </a:xfrm>
-          <a:custGeom>
-            <a:avLst/>
-            <a:gdLst/>
-            <a:ahLst/>
-            <a:cxnLst/>
-            <a:rect l="l" t="t" r="r" b="b"/>
-            <a:pathLst>
-              <a:path w="120000" h="120000" extrusionOk="0">
-                <a:moveTo>
-                  <a:pt x="0" y="0"/>
-                </a:moveTo>
-                <a:lnTo>
-                  <a:pt x="120000" y="0"/>
-                </a:lnTo>
-                <a:lnTo>
-                  <a:pt x="120000" y="120000"/>
-                </a:lnTo>
-                <a:lnTo>
-                  <a:pt x="0" y="120000"/>
-                </a:lnTo>
-                <a:close/>
-              </a:path>
-            </a:pathLst>
-          </a:custGeom>
-        </p:spPr>
-      </p:sp>
-      <p:sp>
-        <p:nvSpPr>
-          <p:cNvPr id="602" name="Google Shape;602;g8f7179da94_0_64:notes"/>
-          <p:cNvSpPr txBox="1">
-            <a:spLocks noGrp="1"/>
-          </p:cNvSpPr>
-          <p:nvPr>
-            <p:ph type="body" idx="1"/>
-          </p:nvPr>
-        </p:nvSpPr>
-        <p:spPr>
-          <a:xfrm>
-            <a:off x="685800" y="4343400"/>
-            <a:ext cx="5486400" cy="4114800"/>
-          </a:xfrm>
-          <a:prstGeom prst="rect">
-            <a:avLst/>
-          </a:prstGeom>
-        </p:spPr>
-        <p:txBody>
-          <a:bodyPr spcFirstLastPara="1" wrap="square" lIns="91425" tIns="91425" rIns="91425" bIns="91425" anchor="t" anchorCtr="0">
-            <a:noAutofit/>
-          </a:bodyPr>
-          <a:lstStyle/>
-          <a:p>
-            <a:pPr marL="0" lvl="0" indent="0" algn="l" rtl="0">
-              <a:spcBef>
-                <a:spcPts val="0"/>
-              </a:spcBef>
-              <a:spcAft>
-                <a:spcPts val="0"/>
-              </a:spcAft>
-              <a:buNone/>
-            </a:pPr>
-            <a:endParaRPr/>
-          </a:p>
-        </p:txBody>
-      </p:sp>
-    </p:spTree>
-  </p:cSld>
-  <p:clrMapOvr>
-    <a:masterClrMapping/>
-  </p:clrMapOvr>
-</p:notes>
-</file>
-
-<file path=ppt/notesSlides/notesSlide17.xml><?xml version="1.0" encoding="utf-8"?>
-<p:notes xmlns:a="http://schemas.openxmlformats.org/drawingml/2006/main" xmlns:r="http://schemas.openxmlformats.org/officeDocument/2006/relationships" xmlns:p="http://schemas.openxmlformats.org/presentationml/2006/main" showMasterSp="0" showMasterPhAnim="0">
-  <p:cSld>
-    <p:spTree>
-      <p:nvGrpSpPr>
         <p:cNvPr id="1" name="Shape 424"/>
         <p:cNvGrpSpPr/>
         <p:nvPr/>
@@ -2954,175 +2849,6 @@
 </file>
 
 <file path=ppt/slideLayouts/slideLayout10.xml><?xml version="1.0" encoding="utf-8"?>
-<p:sldLayout xmlns:a="http://schemas.openxmlformats.org/drawingml/2006/main" xmlns:r="http://schemas.openxmlformats.org/officeDocument/2006/relationships" xmlns:p="http://schemas.openxmlformats.org/presentationml/2006/main" matchingName="Background">
-  <p:cSld name="BLANK_1">
-    <p:bg>
-      <p:bgPr>
-        <a:solidFill>
-          <a:srgbClr val="FFFFFF"/>
-        </a:solidFill>
-        <a:effectLst/>
-      </p:bgPr>
-    </p:bg>
-    <p:spTree>
-      <p:nvGrpSpPr>
-        <p:cNvPr id="1" name="Shape 69"/>
-        <p:cNvGrpSpPr/>
-        <p:nvPr/>
-      </p:nvGrpSpPr>
-      <p:grpSpPr>
-        <a:xfrm>
-          <a:off x="0" y="0"/>
-          <a:ext cx="0" cy="0"/>
-          <a:chOff x="0" y="0"/>
-          <a:chExt cx="0" cy="0"/>
-        </a:xfrm>
-      </p:grpSpPr>
-      <p:sp>
-        <p:nvSpPr>
-          <p:cNvPr id="70" name="Google Shape;70;p14"/>
-          <p:cNvSpPr/>
-          <p:nvPr/>
-        </p:nvSpPr>
-        <p:spPr>
-          <a:xfrm rot="-9387396">
-            <a:off x="-70379" y="-428829"/>
-            <a:ext cx="1802529" cy="1802529"/>
-          </a:xfrm>
-          <a:custGeom>
-            <a:avLst/>
-            <a:gdLst/>
-            <a:ahLst/>
-            <a:cxnLst/>
-            <a:rect l="l" t="t" r="r" b="b"/>
-            <a:pathLst>
-              <a:path w="80403" h="80403" extrusionOk="0">
-                <a:moveTo>
-                  <a:pt x="80402" y="0"/>
-                </a:moveTo>
-                <a:cubicBezTo>
-                  <a:pt x="36029" y="0"/>
-                  <a:pt x="0" y="36095"/>
-                  <a:pt x="0" y="80403"/>
-                </a:cubicBezTo>
-                <a:lnTo>
-                  <a:pt x="30598" y="80403"/>
-                </a:lnTo>
-                <a:cubicBezTo>
-                  <a:pt x="30598" y="52918"/>
-                  <a:pt x="52983" y="30664"/>
-                  <a:pt x="80402" y="30664"/>
-                </a:cubicBezTo>
-                <a:lnTo>
-                  <a:pt x="80402" y="0"/>
-                </a:lnTo>
-                <a:close/>
-              </a:path>
-            </a:pathLst>
-          </a:custGeom>
-          <a:solidFill>
-            <a:srgbClr val="D84E2E"/>
-          </a:solidFill>
-          <a:ln>
-            <a:noFill/>
-          </a:ln>
-        </p:spPr>
-        <p:txBody>
-          <a:bodyPr spcFirstLastPara="1" wrap="square" lIns="91425" tIns="91425" rIns="91425" bIns="91425" anchor="ctr" anchorCtr="0">
-            <a:noAutofit/>
-          </a:bodyPr>
-          <a:lstStyle/>
-          <a:p>
-            <a:pPr marL="0" lvl="0" indent="0" algn="l" rtl="0">
-              <a:spcBef>
-                <a:spcPts val="0"/>
-              </a:spcBef>
-              <a:spcAft>
-                <a:spcPts val="0"/>
-              </a:spcAft>
-              <a:buNone/>
-            </a:pPr>
-            <a:endParaRPr/>
-          </a:p>
-        </p:txBody>
-      </p:sp>
-      <p:sp>
-        <p:nvSpPr>
-          <p:cNvPr id="71" name="Google Shape;71;p14"/>
-          <p:cNvSpPr/>
-          <p:nvPr/>
-        </p:nvSpPr>
-        <p:spPr>
-          <a:xfrm rot="900108">
-            <a:off x="7586327" y="3667699"/>
-            <a:ext cx="1802354" cy="1802354"/>
-          </a:xfrm>
-          <a:custGeom>
-            <a:avLst/>
-            <a:gdLst/>
-            <a:ahLst/>
-            <a:cxnLst/>
-            <a:rect l="l" t="t" r="r" b="b"/>
-            <a:pathLst>
-              <a:path w="80403" h="80403" extrusionOk="0">
-                <a:moveTo>
-                  <a:pt x="80402" y="0"/>
-                </a:moveTo>
-                <a:cubicBezTo>
-                  <a:pt x="36029" y="0"/>
-                  <a:pt x="0" y="36095"/>
-                  <a:pt x="0" y="80403"/>
-                </a:cubicBezTo>
-                <a:lnTo>
-                  <a:pt x="30598" y="80403"/>
-                </a:lnTo>
-                <a:cubicBezTo>
-                  <a:pt x="30598" y="52918"/>
-                  <a:pt x="52983" y="30664"/>
-                  <a:pt x="80402" y="30664"/>
-                </a:cubicBezTo>
-                <a:lnTo>
-                  <a:pt x="80402" y="0"/>
-                </a:lnTo>
-                <a:close/>
-              </a:path>
-            </a:pathLst>
-          </a:custGeom>
-          <a:solidFill>
-            <a:srgbClr val="637B7F"/>
-          </a:solidFill>
-          <a:ln>
-            <a:noFill/>
-          </a:ln>
-        </p:spPr>
-        <p:txBody>
-          <a:bodyPr spcFirstLastPara="1" wrap="square" lIns="91425" tIns="91425" rIns="91425" bIns="91425" anchor="ctr" anchorCtr="0">
-            <a:noAutofit/>
-          </a:bodyPr>
-          <a:lstStyle/>
-          <a:p>
-            <a:pPr marL="0" lvl="0" indent="0" algn="l" rtl="0">
-              <a:spcBef>
-                <a:spcPts val="0"/>
-              </a:spcBef>
-              <a:spcAft>
-                <a:spcPts val="0"/>
-              </a:spcAft>
-              <a:buNone/>
-            </a:pPr>
-            <a:endParaRPr/>
-          </a:p>
-        </p:txBody>
-      </p:sp>
-    </p:spTree>
-  </p:cSld>
-  <p:clrMapOvr>
-    <a:masterClrMapping/>
-  </p:clrMapOvr>
-</p:sldLayout>
-</file>
-
-<file path=ppt/slideLayouts/slideLayout11.xml><?xml version="1.0" encoding="utf-8"?>
 <p:sldLayout xmlns:a="http://schemas.openxmlformats.org/drawingml/2006/main" xmlns:r="http://schemas.openxmlformats.org/officeDocument/2006/relationships" xmlns:p="http://schemas.openxmlformats.org/presentationml/2006/main" matchingName="Title and six columns">
   <p:cSld name="BLANK_1_1">
     <p:bg>
@@ -4887,7 +4613,7 @@
 </p:sldLayout>
 </file>
 
-<file path=ppt/slideLayouts/slideLayout12.xml><?xml version="1.0" encoding="utf-8"?>
+<file path=ppt/slideLayouts/slideLayout11.xml><?xml version="1.0" encoding="utf-8"?>
 <p:sldLayout xmlns:a="http://schemas.openxmlformats.org/drawingml/2006/main" xmlns:r="http://schemas.openxmlformats.org/officeDocument/2006/relationships" xmlns:p="http://schemas.openxmlformats.org/presentationml/2006/main" matchingName="Title and three columns">
   <p:cSld name="CUSTOM_2">
     <p:spTree>
@@ -5584,7 +5310,7 @@
 </p:sldLayout>
 </file>
 
-<file path=ppt/slideLayouts/slideLayout13.xml><?xml version="1.0" encoding="utf-8"?>
+<file path=ppt/slideLayouts/slideLayout12.xml><?xml version="1.0" encoding="utf-8"?>
 <p:sldLayout xmlns:a="http://schemas.openxmlformats.org/drawingml/2006/main" xmlns:r="http://schemas.openxmlformats.org/officeDocument/2006/relationships" xmlns:p="http://schemas.openxmlformats.org/presentationml/2006/main" matchingName="Title only 1">
   <p:cSld name="CUSTOM_3">
     <p:spTree>
@@ -5813,7 +5539,7 @@
 </p:sldLayout>
 </file>
 
-<file path=ppt/slideLayouts/slideLayout14.xml><?xml version="1.0" encoding="utf-8"?>
+<file path=ppt/slideLayouts/slideLayout13.xml><?xml version="1.0" encoding="utf-8"?>
 <p:sldLayout xmlns:a="http://schemas.openxmlformats.org/drawingml/2006/main" xmlns:r="http://schemas.openxmlformats.org/officeDocument/2006/relationships" xmlns:p="http://schemas.openxmlformats.org/presentationml/2006/main" matchingName="Title only 2">
   <p:cSld name="CUSTOM_5">
     <p:spTree>
@@ -6034,7 +5760,7 @@
 </p:sldLayout>
 </file>
 
-<file path=ppt/slideLayouts/slideLayout15.xml><?xml version="1.0" encoding="utf-8"?>
+<file path=ppt/slideLayouts/slideLayout14.xml><?xml version="1.0" encoding="utf-8"?>
 <p:sldLayout xmlns:a="http://schemas.openxmlformats.org/drawingml/2006/main" xmlns:r="http://schemas.openxmlformats.org/officeDocument/2006/relationships" xmlns:p="http://schemas.openxmlformats.org/presentationml/2006/main" matchingName="One column text 1">
   <p:cSld name="CUSTOM_3_1">
     <p:spTree>
@@ -6392,7 +6118,7 @@
 </p:sldLayout>
 </file>
 
-<file path=ppt/slideLayouts/slideLayout16.xml><?xml version="1.0" encoding="utf-8"?>
+<file path=ppt/slideLayouts/slideLayout15.xml><?xml version="1.0" encoding="utf-8"?>
 <p:sldLayout xmlns:a="http://schemas.openxmlformats.org/drawingml/2006/main" xmlns:r="http://schemas.openxmlformats.org/officeDocument/2006/relationships" xmlns:p="http://schemas.openxmlformats.org/presentationml/2006/main" matchingName="Title and four columns">
   <p:cSld name="CUSTOM_4">
     <p:spTree>
@@ -7645,7 +7371,7 @@
 </p:sldLayout>
 </file>
 
-<file path=ppt/slideLayouts/slideLayout17.xml><?xml version="1.0" encoding="utf-8"?>
+<file path=ppt/slideLayouts/slideLayout16.xml><?xml version="1.0" encoding="utf-8"?>
 <p:sldLayout xmlns:a="http://schemas.openxmlformats.org/drawingml/2006/main" xmlns:r="http://schemas.openxmlformats.org/officeDocument/2006/relationships" xmlns:p="http://schemas.openxmlformats.org/presentationml/2006/main" matchingName="Bullet Point 2">
   <p:cSld name="CUSTOM_7_1">
     <p:spTree>
@@ -9371,383 +9097,6 @@
 </file>
 
 <file path=ppt/slideLayouts/slideLayout5.xml><?xml version="1.0" encoding="utf-8"?>
-<p:sldLayout xmlns:a="http://schemas.openxmlformats.org/drawingml/2006/main" xmlns:r="http://schemas.openxmlformats.org/officeDocument/2006/relationships" xmlns:p="http://schemas.openxmlformats.org/presentationml/2006/main" matchingName="Main point">
-  <p:cSld name="MAIN_POINT">
-    <p:spTree>
-      <p:nvGrpSpPr>
-        <p:cNvPr id="1" name="Shape 40"/>
-        <p:cNvGrpSpPr/>
-        <p:nvPr/>
-      </p:nvGrpSpPr>
-      <p:grpSpPr>
-        <a:xfrm>
-          <a:off x="0" y="0"/>
-          <a:ext cx="0" cy="0"/>
-          <a:chOff x="0" y="0"/>
-          <a:chExt cx="0" cy="0"/>
-        </a:xfrm>
-      </p:grpSpPr>
-      <p:sp>
-        <p:nvSpPr>
-          <p:cNvPr id="41" name="Google Shape;41;p8"/>
-          <p:cNvSpPr txBox="1">
-            <a:spLocks noGrp="1"/>
-          </p:cNvSpPr>
-          <p:nvPr>
-            <p:ph type="ctrTitle"/>
-          </p:nvPr>
-        </p:nvSpPr>
-        <p:spPr>
-          <a:xfrm>
-            <a:off x="1566750" y="1538250"/>
-            <a:ext cx="6010500" cy="2067000"/>
-          </a:xfrm>
-          <a:prstGeom prst="rect">
-            <a:avLst/>
-          </a:prstGeom>
-        </p:spPr>
-        <p:txBody>
-          <a:bodyPr spcFirstLastPara="1" wrap="square" lIns="91425" tIns="91425" rIns="91425" bIns="91425" anchor="ctr" anchorCtr="0">
-            <a:noAutofit/>
-          </a:bodyPr>
-          <a:lstStyle>
-            <a:lvl1pPr lvl="0" algn="ctr" rtl="0">
-              <a:spcBef>
-                <a:spcPts val="0"/>
-              </a:spcBef>
-              <a:spcAft>
-                <a:spcPts val="0"/>
-              </a:spcAft>
-              <a:buClr>
-                <a:srgbClr val="EBB55A"/>
-              </a:buClr>
-              <a:buSzPts val="6000"/>
-              <a:buNone/>
-              <a:defRPr sz="6000">
-                <a:solidFill>
-                  <a:srgbClr val="EBB55A"/>
-                </a:solidFill>
-              </a:defRPr>
-            </a:lvl1pPr>
-            <a:lvl2pPr lvl="1" algn="ctr" rtl="0">
-              <a:spcBef>
-                <a:spcPts val="0"/>
-              </a:spcBef>
-              <a:spcAft>
-                <a:spcPts val="0"/>
-              </a:spcAft>
-              <a:buSzPts val="5200"/>
-              <a:buNone/>
-              <a:defRPr sz="5200"/>
-            </a:lvl2pPr>
-            <a:lvl3pPr lvl="2" algn="ctr" rtl="0">
-              <a:spcBef>
-                <a:spcPts val="0"/>
-              </a:spcBef>
-              <a:spcAft>
-                <a:spcPts val="0"/>
-              </a:spcAft>
-              <a:buSzPts val="5200"/>
-              <a:buNone/>
-              <a:defRPr sz="5200"/>
-            </a:lvl3pPr>
-            <a:lvl4pPr lvl="3" algn="ctr" rtl="0">
-              <a:spcBef>
-                <a:spcPts val="0"/>
-              </a:spcBef>
-              <a:spcAft>
-                <a:spcPts val="0"/>
-              </a:spcAft>
-              <a:buSzPts val="5200"/>
-              <a:buNone/>
-              <a:defRPr sz="5200"/>
-            </a:lvl4pPr>
-            <a:lvl5pPr lvl="4" algn="ctr" rtl="0">
-              <a:spcBef>
-                <a:spcPts val="0"/>
-              </a:spcBef>
-              <a:spcAft>
-                <a:spcPts val="0"/>
-              </a:spcAft>
-              <a:buSzPts val="5200"/>
-              <a:buNone/>
-              <a:defRPr sz="5200"/>
-            </a:lvl5pPr>
-            <a:lvl6pPr lvl="5" algn="ctr" rtl="0">
-              <a:spcBef>
-                <a:spcPts val="0"/>
-              </a:spcBef>
-              <a:spcAft>
-                <a:spcPts val="0"/>
-              </a:spcAft>
-              <a:buSzPts val="5200"/>
-              <a:buNone/>
-              <a:defRPr sz="5200"/>
-            </a:lvl6pPr>
-            <a:lvl7pPr lvl="6" algn="ctr" rtl="0">
-              <a:spcBef>
-                <a:spcPts val="0"/>
-              </a:spcBef>
-              <a:spcAft>
-                <a:spcPts val="0"/>
-              </a:spcAft>
-              <a:buSzPts val="5200"/>
-              <a:buNone/>
-              <a:defRPr sz="5200"/>
-            </a:lvl7pPr>
-            <a:lvl8pPr lvl="7" algn="ctr" rtl="0">
-              <a:spcBef>
-                <a:spcPts val="0"/>
-              </a:spcBef>
-              <a:spcAft>
-                <a:spcPts val="0"/>
-              </a:spcAft>
-              <a:buSzPts val="5200"/>
-              <a:buNone/>
-              <a:defRPr sz="5200"/>
-            </a:lvl8pPr>
-            <a:lvl9pPr lvl="8" algn="ctr" rtl="0">
-              <a:spcBef>
-                <a:spcPts val="0"/>
-              </a:spcBef>
-              <a:spcAft>
-                <a:spcPts val="0"/>
-              </a:spcAft>
-              <a:buSzPts val="5200"/>
-              <a:buNone/>
-              <a:defRPr sz="5200"/>
-            </a:lvl9pPr>
-          </a:lstStyle>
-          <a:p>
-            <a:endParaRPr/>
-          </a:p>
-        </p:txBody>
-      </p:sp>
-      <p:sp>
-        <p:nvSpPr>
-          <p:cNvPr id="42" name="Google Shape;42;p8"/>
-          <p:cNvSpPr/>
-          <p:nvPr/>
-        </p:nvSpPr>
-        <p:spPr>
-          <a:xfrm flipH="1">
-            <a:off x="720062" y="540000"/>
-            <a:ext cx="4908900" cy="227700"/>
-          </a:xfrm>
-          <a:prstGeom prst="rect">
-            <a:avLst/>
-          </a:prstGeom>
-          <a:solidFill>
-            <a:schemeClr val="dk2"/>
-          </a:solidFill>
-          <a:ln>
-            <a:noFill/>
-          </a:ln>
-        </p:spPr>
-        <p:txBody>
-          <a:bodyPr spcFirstLastPara="1" wrap="square" lIns="91425" tIns="91425" rIns="91425" bIns="91425" anchor="ctr" anchorCtr="0">
-            <a:noAutofit/>
-          </a:bodyPr>
-          <a:lstStyle/>
-          <a:p>
-            <a:pPr marL="0" lvl="0" indent="0" algn="l" rtl="0">
-              <a:spcBef>
-                <a:spcPts val="0"/>
-              </a:spcBef>
-              <a:spcAft>
-                <a:spcPts val="0"/>
-              </a:spcAft>
-              <a:buNone/>
-            </a:pPr>
-            <a:endParaRPr/>
-          </a:p>
-        </p:txBody>
-      </p:sp>
-      <p:sp>
-        <p:nvSpPr>
-          <p:cNvPr id="43" name="Google Shape;43;p8"/>
-          <p:cNvSpPr/>
-          <p:nvPr/>
-        </p:nvSpPr>
-        <p:spPr>
-          <a:xfrm flipH="1">
-            <a:off x="3515112" y="4341175"/>
-            <a:ext cx="4908900" cy="227700"/>
-          </a:xfrm>
-          <a:prstGeom prst="rect">
-            <a:avLst/>
-          </a:prstGeom>
-          <a:solidFill>
-            <a:schemeClr val="dk2"/>
-          </a:solidFill>
-          <a:ln>
-            <a:noFill/>
-          </a:ln>
-        </p:spPr>
-        <p:txBody>
-          <a:bodyPr spcFirstLastPara="1" wrap="square" lIns="91425" tIns="91425" rIns="91425" bIns="91425" anchor="ctr" anchorCtr="0">
-            <a:noAutofit/>
-          </a:bodyPr>
-          <a:lstStyle/>
-          <a:p>
-            <a:pPr marL="0" lvl="0" indent="0" algn="l" rtl="0">
-              <a:spcBef>
-                <a:spcPts val="0"/>
-              </a:spcBef>
-              <a:spcAft>
-                <a:spcPts val="0"/>
-              </a:spcAft>
-              <a:buNone/>
-            </a:pPr>
-            <a:endParaRPr/>
-          </a:p>
-        </p:txBody>
-      </p:sp>
-      <p:sp>
-        <p:nvSpPr>
-          <p:cNvPr id="44" name="Google Shape;44;p8"/>
-          <p:cNvSpPr/>
-          <p:nvPr/>
-        </p:nvSpPr>
-        <p:spPr>
-          <a:xfrm rot="9387396" flipH="1">
-            <a:off x="7503726" y="-428829"/>
-            <a:ext cx="1802529" cy="1802529"/>
-          </a:xfrm>
-          <a:custGeom>
-            <a:avLst/>
-            <a:gdLst/>
-            <a:ahLst/>
-            <a:cxnLst/>
-            <a:rect l="l" t="t" r="r" b="b"/>
-            <a:pathLst>
-              <a:path w="80403" h="80403" extrusionOk="0">
-                <a:moveTo>
-                  <a:pt x="80402" y="0"/>
-                </a:moveTo>
-                <a:cubicBezTo>
-                  <a:pt x="36029" y="0"/>
-                  <a:pt x="0" y="36095"/>
-                  <a:pt x="0" y="80403"/>
-                </a:cubicBezTo>
-                <a:lnTo>
-                  <a:pt x="30598" y="80403"/>
-                </a:lnTo>
-                <a:cubicBezTo>
-                  <a:pt x="30598" y="52918"/>
-                  <a:pt x="52983" y="30664"/>
-                  <a:pt x="80402" y="30664"/>
-                </a:cubicBezTo>
-                <a:lnTo>
-                  <a:pt x="80402" y="0"/>
-                </a:lnTo>
-                <a:close/>
-              </a:path>
-            </a:pathLst>
-          </a:custGeom>
-          <a:solidFill>
-            <a:schemeClr val="lt2"/>
-          </a:solidFill>
-          <a:ln>
-            <a:noFill/>
-          </a:ln>
-        </p:spPr>
-        <p:txBody>
-          <a:bodyPr spcFirstLastPara="1" wrap="square" lIns="91425" tIns="91425" rIns="91425" bIns="91425" anchor="ctr" anchorCtr="0">
-            <a:noAutofit/>
-          </a:bodyPr>
-          <a:lstStyle/>
-          <a:p>
-            <a:pPr marL="0" lvl="0" indent="0" algn="l" rtl="0">
-              <a:spcBef>
-                <a:spcPts val="0"/>
-              </a:spcBef>
-              <a:spcAft>
-                <a:spcPts val="0"/>
-              </a:spcAft>
-              <a:buNone/>
-            </a:pPr>
-            <a:endParaRPr/>
-          </a:p>
-        </p:txBody>
-      </p:sp>
-      <p:sp>
-        <p:nvSpPr>
-          <p:cNvPr id="45" name="Google Shape;45;p8"/>
-          <p:cNvSpPr/>
-          <p:nvPr/>
-        </p:nvSpPr>
-        <p:spPr>
-          <a:xfrm rot="-900108" flipH="1">
-            <a:off x="-152805" y="3667699"/>
-            <a:ext cx="1802354" cy="1802354"/>
-          </a:xfrm>
-          <a:custGeom>
-            <a:avLst/>
-            <a:gdLst/>
-            <a:ahLst/>
-            <a:cxnLst/>
-            <a:rect l="l" t="t" r="r" b="b"/>
-            <a:pathLst>
-              <a:path w="80403" h="80403" extrusionOk="0">
-                <a:moveTo>
-                  <a:pt x="80402" y="0"/>
-                </a:moveTo>
-                <a:cubicBezTo>
-                  <a:pt x="36029" y="0"/>
-                  <a:pt x="0" y="36095"/>
-                  <a:pt x="0" y="80403"/>
-                </a:cubicBezTo>
-                <a:lnTo>
-                  <a:pt x="30598" y="80403"/>
-                </a:lnTo>
-                <a:cubicBezTo>
-                  <a:pt x="30598" y="52918"/>
-                  <a:pt x="52983" y="30664"/>
-                  <a:pt x="80402" y="30664"/>
-                </a:cubicBezTo>
-                <a:lnTo>
-                  <a:pt x="80402" y="0"/>
-                </a:lnTo>
-                <a:close/>
-              </a:path>
-            </a:pathLst>
-          </a:custGeom>
-          <a:solidFill>
-            <a:schemeClr val="accent1"/>
-          </a:solidFill>
-          <a:ln>
-            <a:noFill/>
-          </a:ln>
-        </p:spPr>
-        <p:txBody>
-          <a:bodyPr spcFirstLastPara="1" wrap="square" lIns="91425" tIns="91425" rIns="91425" bIns="91425" anchor="ctr" anchorCtr="0">
-            <a:noAutofit/>
-          </a:bodyPr>
-          <a:lstStyle/>
-          <a:p>
-            <a:pPr marL="0" lvl="0" indent="0" algn="l" rtl="0">
-              <a:spcBef>
-                <a:spcPts val="0"/>
-              </a:spcBef>
-              <a:spcAft>
-                <a:spcPts val="0"/>
-              </a:spcAft>
-              <a:buNone/>
-            </a:pPr>
-            <a:endParaRPr/>
-          </a:p>
-        </p:txBody>
-      </p:sp>
-    </p:spTree>
-  </p:cSld>
-  <p:clrMapOvr>
-    <a:masterClrMapping/>
-  </p:clrMapOvr>
-</p:sldLayout>
-</file>
-
-<file path=ppt/slideLayouts/slideLayout6.xml><?xml version="1.0" encoding="utf-8"?>
 <p:sldLayout xmlns:a="http://schemas.openxmlformats.org/drawingml/2006/main" xmlns:r="http://schemas.openxmlformats.org/officeDocument/2006/relationships" xmlns:p="http://schemas.openxmlformats.org/presentationml/2006/main" matchingName="Section title and description">
   <p:cSld name="SECTION_TITLE_AND_DESCRIPTION">
     <p:spTree>
@@ -10301,7 +9650,7 @@
 </p:sldLayout>
 </file>
 
-<file path=ppt/slideLayouts/slideLayout7.xml><?xml version="1.0" encoding="utf-8"?>
+<file path=ppt/slideLayouts/slideLayout6.xml><?xml version="1.0" encoding="utf-8"?>
 <p:sldLayout xmlns:a="http://schemas.openxmlformats.org/drawingml/2006/main" xmlns:r="http://schemas.openxmlformats.org/officeDocument/2006/relationships" xmlns:p="http://schemas.openxmlformats.org/presentationml/2006/main" matchingName="Caption">
   <p:cSld name="CAPTION_ONLY">
     <p:spTree>
@@ -10767,7 +10116,7 @@
 </p:sldLayout>
 </file>
 
-<file path=ppt/slideLayouts/slideLayout8.xml><?xml version="1.0" encoding="utf-8"?>
+<file path=ppt/slideLayouts/slideLayout7.xml><?xml version="1.0" encoding="utf-8"?>
 <p:sldLayout xmlns:a="http://schemas.openxmlformats.org/drawingml/2006/main" xmlns:r="http://schemas.openxmlformats.org/officeDocument/2006/relationships" xmlns:p="http://schemas.openxmlformats.org/presentationml/2006/main" matchingName="Big number">
   <p:cSld name="BIG_NUMBER">
     <p:spTree>
@@ -11259,7 +10608,7 @@
 </p:sldLayout>
 </file>
 
-<file path=ppt/slideLayouts/slideLayout9.xml><?xml version="1.0" encoding="utf-8"?>
+<file path=ppt/slideLayouts/slideLayout8.xml><?xml version="1.0" encoding="utf-8"?>
 <p:sldLayout xmlns:a="http://schemas.openxmlformats.org/drawingml/2006/main" xmlns:r="http://schemas.openxmlformats.org/officeDocument/2006/relationships" xmlns:p="http://schemas.openxmlformats.org/presentationml/2006/main" matchingName="Blank" type="blank">
   <p:cSld name="BLANK">
     <p:bg>
@@ -11284,6 +10633,175 @@
           <a:chExt cx="0" cy="0"/>
         </a:xfrm>
       </p:grpSpPr>
+    </p:spTree>
+  </p:cSld>
+  <p:clrMapOvr>
+    <a:masterClrMapping/>
+  </p:clrMapOvr>
+</p:sldLayout>
+</file>
+
+<file path=ppt/slideLayouts/slideLayout9.xml><?xml version="1.0" encoding="utf-8"?>
+<p:sldLayout xmlns:a="http://schemas.openxmlformats.org/drawingml/2006/main" xmlns:r="http://schemas.openxmlformats.org/officeDocument/2006/relationships" xmlns:p="http://schemas.openxmlformats.org/presentationml/2006/main" matchingName="Background">
+  <p:cSld name="BLANK_1">
+    <p:bg>
+      <p:bgPr>
+        <a:solidFill>
+          <a:srgbClr val="FFFFFF"/>
+        </a:solidFill>
+        <a:effectLst/>
+      </p:bgPr>
+    </p:bg>
+    <p:spTree>
+      <p:nvGrpSpPr>
+        <p:cNvPr id="1" name="Shape 69"/>
+        <p:cNvGrpSpPr/>
+        <p:nvPr/>
+      </p:nvGrpSpPr>
+      <p:grpSpPr>
+        <a:xfrm>
+          <a:off x="0" y="0"/>
+          <a:ext cx="0" cy="0"/>
+          <a:chOff x="0" y="0"/>
+          <a:chExt cx="0" cy="0"/>
+        </a:xfrm>
+      </p:grpSpPr>
+      <p:sp>
+        <p:nvSpPr>
+          <p:cNvPr id="70" name="Google Shape;70;p14"/>
+          <p:cNvSpPr/>
+          <p:nvPr/>
+        </p:nvSpPr>
+        <p:spPr>
+          <a:xfrm rot="-9387396">
+            <a:off x="-70379" y="-428829"/>
+            <a:ext cx="1802529" cy="1802529"/>
+          </a:xfrm>
+          <a:custGeom>
+            <a:avLst/>
+            <a:gdLst/>
+            <a:ahLst/>
+            <a:cxnLst/>
+            <a:rect l="l" t="t" r="r" b="b"/>
+            <a:pathLst>
+              <a:path w="80403" h="80403" extrusionOk="0">
+                <a:moveTo>
+                  <a:pt x="80402" y="0"/>
+                </a:moveTo>
+                <a:cubicBezTo>
+                  <a:pt x="36029" y="0"/>
+                  <a:pt x="0" y="36095"/>
+                  <a:pt x="0" y="80403"/>
+                </a:cubicBezTo>
+                <a:lnTo>
+                  <a:pt x="30598" y="80403"/>
+                </a:lnTo>
+                <a:cubicBezTo>
+                  <a:pt x="30598" y="52918"/>
+                  <a:pt x="52983" y="30664"/>
+                  <a:pt x="80402" y="30664"/>
+                </a:cubicBezTo>
+                <a:lnTo>
+                  <a:pt x="80402" y="0"/>
+                </a:lnTo>
+                <a:close/>
+              </a:path>
+            </a:pathLst>
+          </a:custGeom>
+          <a:solidFill>
+            <a:srgbClr val="D84E2E"/>
+          </a:solidFill>
+          <a:ln>
+            <a:noFill/>
+          </a:ln>
+        </p:spPr>
+        <p:txBody>
+          <a:bodyPr spcFirstLastPara="1" wrap="square" lIns="91425" tIns="91425" rIns="91425" bIns="91425" anchor="ctr" anchorCtr="0">
+            <a:noAutofit/>
+          </a:bodyPr>
+          <a:lstStyle/>
+          <a:p>
+            <a:pPr marL="0" lvl="0" indent="0" algn="l" rtl="0">
+              <a:spcBef>
+                <a:spcPts val="0"/>
+              </a:spcBef>
+              <a:spcAft>
+                <a:spcPts val="0"/>
+              </a:spcAft>
+              <a:buNone/>
+            </a:pPr>
+            <a:endParaRPr/>
+          </a:p>
+        </p:txBody>
+      </p:sp>
+      <p:sp>
+        <p:nvSpPr>
+          <p:cNvPr id="71" name="Google Shape;71;p14"/>
+          <p:cNvSpPr/>
+          <p:nvPr/>
+        </p:nvSpPr>
+        <p:spPr>
+          <a:xfrm rot="900108">
+            <a:off x="7586327" y="3667699"/>
+            <a:ext cx="1802354" cy="1802354"/>
+          </a:xfrm>
+          <a:custGeom>
+            <a:avLst/>
+            <a:gdLst/>
+            <a:ahLst/>
+            <a:cxnLst/>
+            <a:rect l="l" t="t" r="r" b="b"/>
+            <a:pathLst>
+              <a:path w="80403" h="80403" extrusionOk="0">
+                <a:moveTo>
+                  <a:pt x="80402" y="0"/>
+                </a:moveTo>
+                <a:cubicBezTo>
+                  <a:pt x="36029" y="0"/>
+                  <a:pt x="0" y="36095"/>
+                  <a:pt x="0" y="80403"/>
+                </a:cubicBezTo>
+                <a:lnTo>
+                  <a:pt x="30598" y="80403"/>
+                </a:lnTo>
+                <a:cubicBezTo>
+                  <a:pt x="30598" y="52918"/>
+                  <a:pt x="52983" y="30664"/>
+                  <a:pt x="80402" y="30664"/>
+                </a:cubicBezTo>
+                <a:lnTo>
+                  <a:pt x="80402" y="0"/>
+                </a:lnTo>
+                <a:close/>
+              </a:path>
+            </a:pathLst>
+          </a:custGeom>
+          <a:solidFill>
+            <a:srgbClr val="637B7F"/>
+          </a:solidFill>
+          <a:ln>
+            <a:noFill/>
+          </a:ln>
+        </p:spPr>
+        <p:txBody>
+          <a:bodyPr spcFirstLastPara="1" wrap="square" lIns="91425" tIns="91425" rIns="91425" bIns="91425" anchor="ctr" anchorCtr="0">
+            <a:noAutofit/>
+          </a:bodyPr>
+          <a:lstStyle/>
+          <a:p>
+            <a:pPr marL="0" lvl="0" indent="0" algn="l" rtl="0">
+              <a:spcBef>
+                <a:spcPts val="0"/>
+              </a:spcBef>
+              <a:spcAft>
+                <a:spcPts val="0"/>
+              </a:spcAft>
+              <a:buNone/>
+            </a:pPr>
+            <a:endParaRPr/>
+          </a:p>
+        </p:txBody>
+      </p:sp>
     </p:spTree>
   </p:cSld>
   <p:clrMapOvr>
@@ -11794,19 +11312,18 @@
     <p:sldLayoutId id="2147483651" r:id="rId2"/>
     <p:sldLayoutId id="2147483652" r:id="rId3"/>
     <p:sldLayoutId id="2147483653" r:id="rId4"/>
-    <p:sldLayoutId id="2147483654" r:id="rId5"/>
-    <p:sldLayoutId id="2147483655" r:id="rId6"/>
-    <p:sldLayoutId id="2147483656" r:id="rId7"/>
-    <p:sldLayoutId id="2147483657" r:id="rId8"/>
-    <p:sldLayoutId id="2147483658" r:id="rId9"/>
-    <p:sldLayoutId id="2147483660" r:id="rId10"/>
-    <p:sldLayoutId id="2147483661" r:id="rId11"/>
-    <p:sldLayoutId id="2147483663" r:id="rId12"/>
-    <p:sldLayoutId id="2147483664" r:id="rId13"/>
-    <p:sldLayoutId id="2147483665" r:id="rId14"/>
-    <p:sldLayoutId id="2147483669" r:id="rId15"/>
-    <p:sldLayoutId id="2147483672" r:id="rId16"/>
-    <p:sldLayoutId id="2147483674" r:id="rId17"/>
+    <p:sldLayoutId id="2147483655" r:id="rId5"/>
+    <p:sldLayoutId id="2147483656" r:id="rId6"/>
+    <p:sldLayoutId id="2147483657" r:id="rId7"/>
+    <p:sldLayoutId id="2147483658" r:id="rId8"/>
+    <p:sldLayoutId id="2147483660" r:id="rId9"/>
+    <p:sldLayoutId id="2147483661" r:id="rId10"/>
+    <p:sldLayoutId id="2147483663" r:id="rId11"/>
+    <p:sldLayoutId id="2147483664" r:id="rId12"/>
+    <p:sldLayoutId id="2147483665" r:id="rId13"/>
+    <p:sldLayoutId id="2147483669" r:id="rId14"/>
+    <p:sldLayoutId id="2147483672" r:id="rId15"/>
+    <p:sldLayoutId id="2147483674" r:id="rId16"/>
   </p:sldLayoutIdLst>
   <p:hf sldNum="0" hdr="0" ftr="0" dt="0"/>
   <p:txStyles>
@@ -27375,590 +26892,6 @@
   <p:cSld>
     <p:spTree>
       <p:nvGrpSpPr>
-        <p:cNvPr id="1" name="Shape 603"/>
-        <p:cNvGrpSpPr/>
-        <p:nvPr/>
-      </p:nvGrpSpPr>
-      <p:grpSpPr>
-        <a:xfrm>
-          <a:off x="0" y="0"/>
-          <a:ext cx="0" cy="0"/>
-          <a:chOff x="0" y="0"/>
-          <a:chExt cx="0" cy="0"/>
-        </a:xfrm>
-      </p:grpSpPr>
-      <p:sp>
-        <p:nvSpPr>
-          <p:cNvPr id="604" name="Google Shape;604;p56"/>
-          <p:cNvSpPr txBox="1">
-            <a:spLocks noGrp="1"/>
-          </p:cNvSpPr>
-          <p:nvPr>
-            <p:ph type="ctrTitle"/>
-          </p:nvPr>
-        </p:nvSpPr>
-        <p:spPr>
-          <a:xfrm>
-            <a:off x="1566750" y="1538250"/>
-            <a:ext cx="6010500" cy="2067000"/>
-          </a:xfrm>
-          <a:prstGeom prst="rect">
-            <a:avLst/>
-          </a:prstGeom>
-        </p:spPr>
-        <p:txBody>
-          <a:bodyPr spcFirstLastPara="1" wrap="square" lIns="91425" tIns="91425" rIns="91425" bIns="91425" anchor="ctr" anchorCtr="0">
-            <a:noAutofit/>
-          </a:bodyPr>
-          <a:lstStyle/>
-          <a:p>
-            <a:pPr marL="0" lvl="0" indent="0" algn="ctr" rtl="0">
-              <a:spcBef>
-                <a:spcPts val="0"/>
-              </a:spcBef>
-              <a:spcAft>
-                <a:spcPts val="0"/>
-              </a:spcAft>
-              <a:buNone/>
-            </a:pPr>
-            <a:r>
-              <a:rPr lang="it-IT" sz="6000" dirty="0"/>
-              <a:t>DOMANDE?</a:t>
-            </a:r>
-            <a:endParaRPr sz="6000" dirty="0"/>
-          </a:p>
-        </p:txBody>
-      </p:sp>
-      <p:sp>
-        <p:nvSpPr>
-          <p:cNvPr id="3" name="Google Shape;188;p33">
-            <a:extLst>
-              <a:ext uri="{FF2B5EF4-FFF2-40B4-BE49-F238E27FC236}">
-                <a16:creationId xmlns:a16="http://schemas.microsoft.com/office/drawing/2014/main" id="{9C0D47B3-FF4E-41AE-ACAC-4E0385BE496E}"/>
-              </a:ext>
-            </a:extLst>
-          </p:cNvPr>
-          <p:cNvSpPr txBox="1">
-            <a:spLocks/>
-          </p:cNvSpPr>
-          <p:nvPr/>
-        </p:nvSpPr>
-        <p:spPr>
-          <a:xfrm>
-            <a:off x="2030819" y="4796833"/>
-            <a:ext cx="7113181" cy="346667"/>
-          </a:xfrm>
-          <a:prstGeom prst="rect">
-            <a:avLst/>
-          </a:prstGeom>
-          <a:noFill/>
-          <a:ln>
-            <a:noFill/>
-          </a:ln>
-        </p:spPr>
-        <p:txBody>
-          <a:bodyPr spcFirstLastPara="1" wrap="square" lIns="91425" tIns="91425" rIns="91425" bIns="91425" anchor="ctr" anchorCtr="0">
-            <a:noAutofit/>
-          </a:bodyPr>
-          <a:lstStyle>
-            <a:defPPr marR="0" lvl="0" algn="l" rtl="0">
-              <a:lnSpc>
-                <a:spcPct val="100000"/>
-              </a:lnSpc>
-              <a:spcBef>
-                <a:spcPts val="0"/>
-              </a:spcBef>
-              <a:spcAft>
-                <a:spcPts val="0"/>
-              </a:spcAft>
-            </a:defPPr>
-            <a:lvl1pPr marR="0" lvl="0" algn="ctr" rtl="0">
-              <a:lnSpc>
-                <a:spcPct val="100000"/>
-              </a:lnSpc>
-              <a:spcBef>
-                <a:spcPts val="0"/>
-              </a:spcBef>
-              <a:spcAft>
-                <a:spcPts val="0"/>
-              </a:spcAft>
-              <a:buClr>
-                <a:schemeClr val="accent1"/>
-              </a:buClr>
-              <a:buSzPts val="6000"/>
-              <a:buFont typeface="Reem Kufi"/>
-              <a:buNone/>
-              <a:defRPr sz="6000" b="0" i="0" u="none" strike="noStrike" cap="none">
-                <a:solidFill>
-                  <a:schemeClr val="accent1"/>
-                </a:solidFill>
-                <a:latin typeface="Reem Kufi"/>
-                <a:ea typeface="Reem Kufi"/>
-                <a:cs typeface="Reem Kufi"/>
-                <a:sym typeface="Reem Kufi"/>
-              </a:defRPr>
-            </a:lvl1pPr>
-            <a:lvl2pPr marR="0" lvl="1" algn="ctr" rtl="0">
-              <a:lnSpc>
-                <a:spcPct val="100000"/>
-              </a:lnSpc>
-              <a:spcBef>
-                <a:spcPts val="0"/>
-              </a:spcBef>
-              <a:spcAft>
-                <a:spcPts val="0"/>
-              </a:spcAft>
-              <a:buClr>
-                <a:schemeClr val="dk1"/>
-              </a:buClr>
-              <a:buSzPts val="12000"/>
-              <a:buFont typeface="Arial"/>
-              <a:buNone/>
-              <a:defRPr sz="12000" b="0" i="0" u="none" strike="noStrike" cap="none">
-                <a:solidFill>
-                  <a:schemeClr val="dk1"/>
-                </a:solidFill>
-                <a:latin typeface="Arial"/>
-                <a:ea typeface="Arial"/>
-                <a:cs typeface="Arial"/>
-                <a:sym typeface="Arial"/>
-              </a:defRPr>
-            </a:lvl2pPr>
-            <a:lvl3pPr marR="0" lvl="2" algn="ctr" rtl="0">
-              <a:lnSpc>
-                <a:spcPct val="100000"/>
-              </a:lnSpc>
-              <a:spcBef>
-                <a:spcPts val="0"/>
-              </a:spcBef>
-              <a:spcAft>
-                <a:spcPts val="0"/>
-              </a:spcAft>
-              <a:buClr>
-                <a:schemeClr val="dk1"/>
-              </a:buClr>
-              <a:buSzPts val="12000"/>
-              <a:buFont typeface="Arial"/>
-              <a:buNone/>
-              <a:defRPr sz="12000" b="0" i="0" u="none" strike="noStrike" cap="none">
-                <a:solidFill>
-                  <a:schemeClr val="dk1"/>
-                </a:solidFill>
-                <a:latin typeface="Arial"/>
-                <a:ea typeface="Arial"/>
-                <a:cs typeface="Arial"/>
-                <a:sym typeface="Arial"/>
-              </a:defRPr>
-            </a:lvl3pPr>
-            <a:lvl4pPr marR="0" lvl="3" algn="ctr" rtl="0">
-              <a:lnSpc>
-                <a:spcPct val="100000"/>
-              </a:lnSpc>
-              <a:spcBef>
-                <a:spcPts val="0"/>
-              </a:spcBef>
-              <a:spcAft>
-                <a:spcPts val="0"/>
-              </a:spcAft>
-              <a:buClr>
-                <a:schemeClr val="dk1"/>
-              </a:buClr>
-              <a:buSzPts val="12000"/>
-              <a:buFont typeface="Arial"/>
-              <a:buNone/>
-              <a:defRPr sz="12000" b="0" i="0" u="none" strike="noStrike" cap="none">
-                <a:solidFill>
-                  <a:schemeClr val="dk1"/>
-                </a:solidFill>
-                <a:latin typeface="Arial"/>
-                <a:ea typeface="Arial"/>
-                <a:cs typeface="Arial"/>
-                <a:sym typeface="Arial"/>
-              </a:defRPr>
-            </a:lvl4pPr>
-            <a:lvl5pPr marR="0" lvl="4" algn="ctr" rtl="0">
-              <a:lnSpc>
-                <a:spcPct val="100000"/>
-              </a:lnSpc>
-              <a:spcBef>
-                <a:spcPts val="0"/>
-              </a:spcBef>
-              <a:spcAft>
-                <a:spcPts val="0"/>
-              </a:spcAft>
-              <a:buClr>
-                <a:schemeClr val="dk1"/>
-              </a:buClr>
-              <a:buSzPts val="12000"/>
-              <a:buFont typeface="Arial"/>
-              <a:buNone/>
-              <a:defRPr sz="12000" b="0" i="0" u="none" strike="noStrike" cap="none">
-                <a:solidFill>
-                  <a:schemeClr val="dk1"/>
-                </a:solidFill>
-                <a:latin typeface="Arial"/>
-                <a:ea typeface="Arial"/>
-                <a:cs typeface="Arial"/>
-                <a:sym typeface="Arial"/>
-              </a:defRPr>
-            </a:lvl5pPr>
-            <a:lvl6pPr marR="0" lvl="5" algn="ctr" rtl="0">
-              <a:lnSpc>
-                <a:spcPct val="100000"/>
-              </a:lnSpc>
-              <a:spcBef>
-                <a:spcPts val="0"/>
-              </a:spcBef>
-              <a:spcAft>
-                <a:spcPts val="0"/>
-              </a:spcAft>
-              <a:buClr>
-                <a:schemeClr val="dk1"/>
-              </a:buClr>
-              <a:buSzPts val="12000"/>
-              <a:buFont typeface="Arial"/>
-              <a:buNone/>
-              <a:defRPr sz="12000" b="0" i="0" u="none" strike="noStrike" cap="none">
-                <a:solidFill>
-                  <a:schemeClr val="dk1"/>
-                </a:solidFill>
-                <a:latin typeface="Arial"/>
-                <a:ea typeface="Arial"/>
-                <a:cs typeface="Arial"/>
-                <a:sym typeface="Arial"/>
-              </a:defRPr>
-            </a:lvl6pPr>
-            <a:lvl7pPr marR="0" lvl="6" algn="ctr" rtl="0">
-              <a:lnSpc>
-                <a:spcPct val="100000"/>
-              </a:lnSpc>
-              <a:spcBef>
-                <a:spcPts val="0"/>
-              </a:spcBef>
-              <a:spcAft>
-                <a:spcPts val="0"/>
-              </a:spcAft>
-              <a:buClr>
-                <a:schemeClr val="dk1"/>
-              </a:buClr>
-              <a:buSzPts val="12000"/>
-              <a:buFont typeface="Arial"/>
-              <a:buNone/>
-              <a:defRPr sz="12000" b="0" i="0" u="none" strike="noStrike" cap="none">
-                <a:solidFill>
-                  <a:schemeClr val="dk1"/>
-                </a:solidFill>
-                <a:latin typeface="Arial"/>
-                <a:ea typeface="Arial"/>
-                <a:cs typeface="Arial"/>
-                <a:sym typeface="Arial"/>
-              </a:defRPr>
-            </a:lvl7pPr>
-            <a:lvl8pPr marR="0" lvl="7" algn="ctr" rtl="0">
-              <a:lnSpc>
-                <a:spcPct val="100000"/>
-              </a:lnSpc>
-              <a:spcBef>
-                <a:spcPts val="0"/>
-              </a:spcBef>
-              <a:spcAft>
-                <a:spcPts val="0"/>
-              </a:spcAft>
-              <a:buClr>
-                <a:schemeClr val="dk1"/>
-              </a:buClr>
-              <a:buSzPts val="12000"/>
-              <a:buFont typeface="Arial"/>
-              <a:buNone/>
-              <a:defRPr sz="12000" b="0" i="0" u="none" strike="noStrike" cap="none">
-                <a:solidFill>
-                  <a:schemeClr val="dk1"/>
-                </a:solidFill>
-                <a:latin typeface="Arial"/>
-                <a:ea typeface="Arial"/>
-                <a:cs typeface="Arial"/>
-                <a:sym typeface="Arial"/>
-              </a:defRPr>
-            </a:lvl8pPr>
-            <a:lvl9pPr marR="0" lvl="8" algn="ctr" rtl="0">
-              <a:lnSpc>
-                <a:spcPct val="100000"/>
-              </a:lnSpc>
-              <a:spcBef>
-                <a:spcPts val="0"/>
-              </a:spcBef>
-              <a:spcAft>
-                <a:spcPts val="0"/>
-              </a:spcAft>
-              <a:buClr>
-                <a:schemeClr val="dk1"/>
-              </a:buClr>
-              <a:buSzPts val="12000"/>
-              <a:buFont typeface="Arial"/>
-              <a:buNone/>
-              <a:defRPr sz="12000" b="0" i="0" u="none" strike="noStrike" cap="none">
-                <a:solidFill>
-                  <a:schemeClr val="dk1"/>
-                </a:solidFill>
-                <a:latin typeface="Arial"/>
-                <a:ea typeface="Arial"/>
-                <a:cs typeface="Arial"/>
-                <a:sym typeface="Arial"/>
-              </a:defRPr>
-            </a:lvl9pPr>
-          </a:lstStyle>
-          <a:p>
-            <a:pPr algn="l"/>
-            <a:r>
-              <a:rPr lang="it-IT" sz="1200" b="1" i="1" dirty="0">
-                <a:solidFill>
-                  <a:schemeClr val="accent1">
-                    <a:lumMod val="75000"/>
-                  </a:schemeClr>
-                </a:solidFill>
-              </a:rPr>
-              <a:t>Intelligenza Artificiale per il rilevamento dei pedoni in ambiente simulato – Ferrara Carmine A.A. 2019/2020</a:t>
-            </a:r>
-            <a:endParaRPr lang="it-IT" sz="1200" dirty="0">
-              <a:solidFill>
-                <a:schemeClr val="accent1">
-                  <a:lumMod val="75000"/>
-                </a:schemeClr>
-              </a:solidFill>
-            </a:endParaRPr>
-          </a:p>
-        </p:txBody>
-      </p:sp>
-    </p:spTree>
-  </p:cSld>
-  <p:clrMapOvr>
-    <a:masterClrMapping/>
-  </p:clrMapOvr>
-  <p:transition spd="slow">
-    <p:randomBar dir="vert"/>
-  </p:transition>
-  <p:timing>
-    <p:tnLst>
-      <p:par>
-        <p:cTn id="1" dur="indefinite" restart="never" nodeType="tmRoot">
-          <p:childTnLst>
-            <p:seq concurrent="1" nextAc="seek">
-              <p:cTn id="2" dur="indefinite" nodeType="mainSeq">
-                <p:childTnLst>
-                  <p:par>
-                    <p:cTn id="3" fill="hold">
-                      <p:stCondLst>
-                        <p:cond delay="indefinite"/>
-                      </p:stCondLst>
-                      <p:childTnLst>
-                        <p:par>
-                          <p:cTn id="4" fill="hold">
-                            <p:stCondLst>
-                              <p:cond delay="0"/>
-                            </p:stCondLst>
-                            <p:childTnLst>
-                              <p:par>
-                                <p:cTn id="5" presetID="42" presetClass="entr" presetSubtype="0" fill="hold" grpId="0" nodeType="clickEffect">
-                                  <p:stCondLst>
-                                    <p:cond delay="0"/>
-                                  </p:stCondLst>
-                                  <p:childTnLst>
-                                    <p:set>
-                                      <p:cBhvr>
-                                        <p:cTn id="6" dur="1" fill="hold">
-                                          <p:stCondLst>
-                                            <p:cond delay="0"/>
-                                          </p:stCondLst>
-                                        </p:cTn>
-                                        <p:tgtEl>
-                                          <p:spTgt spid="3"/>
-                                        </p:tgtEl>
-                                        <p:attrNameLst>
-                                          <p:attrName>style.visibility</p:attrName>
-                                        </p:attrNameLst>
-                                      </p:cBhvr>
-                                      <p:to>
-                                        <p:strVal val="visible"/>
-                                      </p:to>
-                                    </p:set>
-                                    <p:animEffect transition="in" filter="fade">
-                                      <p:cBhvr>
-                                        <p:cTn id="7" dur="1000"/>
-                                        <p:tgtEl>
-                                          <p:spTgt spid="3"/>
-                                        </p:tgtEl>
-                                      </p:cBhvr>
-                                    </p:animEffect>
-                                    <p:anim calcmode="lin" valueType="num">
-                                      <p:cBhvr>
-                                        <p:cTn id="8" dur="1000" fill="hold"/>
-                                        <p:tgtEl>
-                                          <p:spTgt spid="3"/>
-                                        </p:tgtEl>
-                                        <p:attrNameLst>
-                                          <p:attrName>ppt_x</p:attrName>
-                                        </p:attrNameLst>
-                                      </p:cBhvr>
-                                      <p:tavLst>
-                                        <p:tav tm="0">
-                                          <p:val>
-                                            <p:strVal val="#ppt_x"/>
-                                          </p:val>
-                                        </p:tav>
-                                        <p:tav tm="100000">
-                                          <p:val>
-                                            <p:strVal val="#ppt_x"/>
-                                          </p:val>
-                                        </p:tav>
-                                      </p:tavLst>
-                                    </p:anim>
-                                    <p:anim calcmode="lin" valueType="num">
-                                      <p:cBhvr>
-                                        <p:cTn id="9" dur="1000" fill="hold"/>
-                                        <p:tgtEl>
-                                          <p:spTgt spid="3"/>
-                                        </p:tgtEl>
-                                        <p:attrNameLst>
-                                          <p:attrName>ppt_y</p:attrName>
-                                        </p:attrNameLst>
-                                      </p:cBhvr>
-                                      <p:tavLst>
-                                        <p:tav tm="0">
-                                          <p:val>
-                                            <p:strVal val="#ppt_y+.1"/>
-                                          </p:val>
-                                        </p:tav>
-                                        <p:tav tm="100000">
-                                          <p:val>
-                                            <p:strVal val="#ppt_y"/>
-                                          </p:val>
-                                        </p:tav>
-                                      </p:tavLst>
-                                    </p:anim>
-                                  </p:childTnLst>
-                                </p:cTn>
-                              </p:par>
-                              <p:par>
-                                <p:cTn id="10" presetID="42" presetClass="entr" presetSubtype="0" fill="hold" grpId="0" nodeType="withEffect">
-                                  <p:stCondLst>
-                                    <p:cond delay="0"/>
-                                  </p:stCondLst>
-                                  <p:childTnLst>
-                                    <p:set>
-                                      <p:cBhvr>
-                                        <p:cTn id="11" dur="1" fill="hold">
-                                          <p:stCondLst>
-                                            <p:cond delay="0"/>
-                                          </p:stCondLst>
-                                        </p:cTn>
-                                        <p:tgtEl>
-                                          <p:spTgt spid="604"/>
-                                        </p:tgtEl>
-                                        <p:attrNameLst>
-                                          <p:attrName>style.visibility</p:attrName>
-                                        </p:attrNameLst>
-                                      </p:cBhvr>
-                                      <p:to>
-                                        <p:strVal val="visible"/>
-                                      </p:to>
-                                    </p:set>
-                                    <p:animEffect transition="in" filter="fade">
-                                      <p:cBhvr>
-                                        <p:cTn id="12" dur="1000"/>
-                                        <p:tgtEl>
-                                          <p:spTgt spid="604"/>
-                                        </p:tgtEl>
-                                      </p:cBhvr>
-                                    </p:animEffect>
-                                    <p:anim calcmode="lin" valueType="num">
-                                      <p:cBhvr>
-                                        <p:cTn id="13" dur="1000" fill="hold"/>
-                                        <p:tgtEl>
-                                          <p:spTgt spid="604"/>
-                                        </p:tgtEl>
-                                        <p:attrNameLst>
-                                          <p:attrName>ppt_x</p:attrName>
-                                        </p:attrNameLst>
-                                      </p:cBhvr>
-                                      <p:tavLst>
-                                        <p:tav tm="0">
-                                          <p:val>
-                                            <p:strVal val="#ppt_x"/>
-                                          </p:val>
-                                        </p:tav>
-                                        <p:tav tm="100000">
-                                          <p:val>
-                                            <p:strVal val="#ppt_x"/>
-                                          </p:val>
-                                        </p:tav>
-                                      </p:tavLst>
-                                    </p:anim>
-                                    <p:anim calcmode="lin" valueType="num">
-                                      <p:cBhvr>
-                                        <p:cTn id="14" dur="1000" fill="hold"/>
-                                        <p:tgtEl>
-                                          <p:spTgt spid="604"/>
-                                        </p:tgtEl>
-                                        <p:attrNameLst>
-                                          <p:attrName>ppt_y</p:attrName>
-                                        </p:attrNameLst>
-                                      </p:cBhvr>
-                                      <p:tavLst>
-                                        <p:tav tm="0">
-                                          <p:val>
-                                            <p:strVal val="#ppt_y+.1"/>
-                                          </p:val>
-                                        </p:tav>
-                                        <p:tav tm="100000">
-                                          <p:val>
-                                            <p:strVal val="#ppt_y"/>
-                                          </p:val>
-                                        </p:tav>
-                                      </p:tavLst>
-                                    </p:anim>
-                                  </p:childTnLst>
-                                </p:cTn>
-                              </p:par>
-                            </p:childTnLst>
-                          </p:cTn>
-                        </p:par>
-                      </p:childTnLst>
-                    </p:cTn>
-                  </p:par>
-                </p:childTnLst>
-              </p:cTn>
-              <p:prevCondLst>
-                <p:cond evt="onPrev" delay="0">
-                  <p:tgtEl>
-                    <p:sldTgt/>
-                  </p:tgtEl>
-                </p:cond>
-              </p:prevCondLst>
-              <p:nextCondLst>
-                <p:cond evt="onNext" delay="0">
-                  <p:tgtEl>
-                    <p:sldTgt/>
-                  </p:tgtEl>
-                </p:cond>
-              </p:nextCondLst>
-            </p:seq>
-          </p:childTnLst>
-        </p:cTn>
-      </p:par>
-    </p:tnLst>
-    <p:bldLst>
-      <p:bldP spid="604" grpId="0"/>
-      <p:bldP spid="3" grpId="0"/>
-    </p:bldLst>
-  </p:timing>
-</p:sld>
-</file>
-
-<file path=ppt/slides/slide17.xml><?xml version="1.0" encoding="utf-8"?>
-<p:sld xmlns:a="http://schemas.openxmlformats.org/drawingml/2006/main" xmlns:r="http://schemas.openxmlformats.org/officeDocument/2006/relationships" xmlns:p="http://schemas.openxmlformats.org/presentationml/2006/main">
-  <p:cSld>
-    <p:spTree>
-      <p:nvGrpSpPr>
         <p:cNvPr id="1" name="Shape 427"/>
         <p:cNvGrpSpPr/>
         <p:nvPr/>

</xml_diff>